<commit_message>
Módulos atualizados. Laboratórios substituidos.
</commit_message>
<xml_diff>
--- a/MÓDULOS DE AULA/Módulo 11 - Funções.pptx
+++ b/MÓDULOS DE AULA/Módulo 11 - Funções.pptx
@@ -419,14 +419,14 @@
           </a:bodyPr>
           <a:lstStyle>
             <a:lvl1pPr algn="r" defTabSz="965200" eaLnBrk="1" hangingPunct="1">
-              <a:defRPr sz="1200" smtClean="0"/>
+              <a:defRPr sz="1200"/>
             </a:lvl1pPr>
           </a:lstStyle>
           <a:p>
             <a:pPr>
               <a:defRPr/>
             </a:pPr>
-            <a:fld id="{8BB8E569-6B62-4636-86D5-8B913B20899C}" type="slidenum">
+            <a:fld id="{2DD102D2-AD48-4D22-BEB5-13C4BE9A94CA}" type="slidenum">
               <a:rPr lang="pt-BR" altLang="pt-BR"/>
               <a:pPr>
                 <a:defRPr/>
@@ -440,7 +440,7 @@
     </p:spTree>
     <p:extLst>
       <p:ext uri="{BB962C8B-B14F-4D97-AF65-F5344CB8AC3E}">
-        <p14:creationId xmlns:p14="http://schemas.microsoft.com/office/powerpoint/2010/main" val="3186688881"/>
+        <p14:creationId xmlns:p14="http://schemas.microsoft.com/office/powerpoint/2010/main" val="175043877"/>
       </p:ext>
     </p:extLst>
   </p:cSld>
@@ -761,14 +761,14 @@
           </a:bodyPr>
           <a:lstStyle>
             <a:lvl1pPr algn="r" defTabSz="965200" eaLnBrk="1" hangingPunct="1">
-              <a:defRPr sz="1200" smtClean="0"/>
+              <a:defRPr sz="1200"/>
             </a:lvl1pPr>
           </a:lstStyle>
           <a:p>
             <a:pPr>
               <a:defRPr/>
             </a:pPr>
-            <a:fld id="{80974D94-175A-4D2B-9ED7-CCB95E7894F9}" type="slidenum">
+            <a:fld id="{905AC483-278E-4F6F-84D1-794F7CBE03F9}" type="slidenum">
               <a:rPr lang="pt-BR" altLang="pt-BR"/>
               <a:pPr>
                 <a:defRPr/>
@@ -782,7 +782,7 @@
     </p:spTree>
     <p:extLst>
       <p:ext uri="{BB962C8B-B14F-4D97-AF65-F5344CB8AC3E}">
-        <p14:creationId xmlns:p14="http://schemas.microsoft.com/office/powerpoint/2010/main" val="1939590637"/>
+        <p14:creationId xmlns:p14="http://schemas.microsoft.com/office/powerpoint/2010/main" val="1190876156"/>
       </p:ext>
     </p:extLst>
   </p:cSld>
@@ -953,12 +953,12 @@
             <a:pPr>
               <a:defRPr/>
             </a:pPr>
-            <a:fld id="{2A960859-8865-4F3F-AB2E-3CAD4054E082}" type="datetime1">
+            <a:fld id="{5A9E2135-BF4E-4C2F-9EC0-C82B42289472}" type="datetime1">
               <a:rPr lang="pt-BR"/>
               <a:pPr>
                 <a:defRPr/>
               </a:pPr>
-              <a:t>29/07/2016</a:t>
+              <a:t>14/09/2016</a:t>
             </a:fld>
             <a:endParaRPr lang="pt-BR" dirty="0"/>
           </a:p>
@@ -1016,7 +1016,7 @@
             <a:pPr>
               <a:defRPr/>
             </a:pPr>
-            <a:fld id="{1AD915F2-2D36-4BEC-947F-1CADBF8F20F5}" type="slidenum">
+            <a:fld id="{7E37B365-CF4C-44AA-8393-DD215D2094FA}" type="slidenum">
               <a:rPr lang="pt-BR" altLang="pt-BR"/>
               <a:pPr>
                 <a:defRPr/>
@@ -1030,7 +1030,7 @@
     </p:spTree>
     <p:extLst>
       <p:ext uri="{BB962C8B-B14F-4D97-AF65-F5344CB8AC3E}">
-        <p14:creationId xmlns:p14="http://schemas.microsoft.com/office/powerpoint/2010/main" val="1625543898"/>
+        <p14:creationId xmlns:p14="http://schemas.microsoft.com/office/powerpoint/2010/main" val="2163327275"/>
       </p:ext>
     </p:extLst>
   </p:cSld>
@@ -1081,12 +1081,12 @@
             <a:pPr>
               <a:defRPr/>
             </a:pPr>
-            <a:fld id="{6404B4FF-5E07-4809-8361-E4BB8A5ADF01}" type="datetime1">
+            <a:fld id="{B5AA900A-D002-41FA-9B9D-CC0D01245E0D}" type="datetime1">
               <a:rPr lang="pt-BR"/>
               <a:pPr>
                 <a:defRPr/>
               </a:pPr>
-              <a:t>29/07/2016</a:t>
+              <a:t>14/09/2016</a:t>
             </a:fld>
             <a:endParaRPr lang="pt-BR" dirty="0"/>
           </a:p>
@@ -1144,7 +1144,7 @@
             <a:pPr>
               <a:defRPr/>
             </a:pPr>
-            <a:fld id="{89DB58E1-92D5-4CFD-AB2E-27B20496D774}" type="slidenum">
+            <a:fld id="{567DF1FA-7713-4439-845F-48EA091E095E}" type="slidenum">
               <a:rPr lang="pt-BR" altLang="pt-BR"/>
               <a:pPr>
                 <a:defRPr/>
@@ -1158,7 +1158,7 @@
     </p:spTree>
     <p:extLst>
       <p:ext uri="{BB962C8B-B14F-4D97-AF65-F5344CB8AC3E}">
-        <p14:creationId xmlns:p14="http://schemas.microsoft.com/office/powerpoint/2010/main" val="3748998562"/>
+        <p14:creationId xmlns:p14="http://schemas.microsoft.com/office/powerpoint/2010/main" val="1066478025"/>
       </p:ext>
     </p:extLst>
   </p:cSld>
@@ -1209,12 +1209,12 @@
             <a:pPr>
               <a:defRPr/>
             </a:pPr>
-            <a:fld id="{ED01C958-B33C-4114-892A-1B70852E43EA}" type="datetime1">
+            <a:fld id="{571DB08C-8BA9-403A-8550-069AF873D3B6}" type="datetime1">
               <a:rPr lang="pt-BR"/>
               <a:pPr>
                 <a:defRPr/>
               </a:pPr>
-              <a:t>29/07/2016</a:t>
+              <a:t>14/09/2016</a:t>
             </a:fld>
             <a:endParaRPr lang="pt-BR" dirty="0"/>
           </a:p>
@@ -1272,7 +1272,7 @@
             <a:pPr>
               <a:defRPr/>
             </a:pPr>
-            <a:fld id="{94A63AC2-AB7A-4B21-8186-40E5AF5B94C5}" type="slidenum">
+            <a:fld id="{817784E2-EBD1-449C-BB50-BD5268694D3B}" type="slidenum">
               <a:rPr lang="pt-BR" altLang="pt-BR"/>
               <a:pPr>
                 <a:defRPr/>
@@ -1286,7 +1286,7 @@
     </p:spTree>
     <p:extLst>
       <p:ext uri="{BB962C8B-B14F-4D97-AF65-F5344CB8AC3E}">
-        <p14:creationId xmlns:p14="http://schemas.microsoft.com/office/powerpoint/2010/main" val="113857784"/>
+        <p14:creationId xmlns:p14="http://schemas.microsoft.com/office/powerpoint/2010/main" val="3364257742"/>
       </p:ext>
     </p:extLst>
   </p:cSld>
@@ -1544,12 +1544,12 @@
             <a:pPr>
               <a:defRPr/>
             </a:pPr>
-            <a:fld id="{DEF9D5CF-F3B1-4C83-8BF0-0423EDA53D6F}" type="datetime1">
+            <a:fld id="{2EE73D7E-6DFB-48DA-A5BF-41B2F99A0AB1}" type="datetime1">
               <a:rPr lang="pt-BR"/>
               <a:pPr>
                 <a:defRPr/>
               </a:pPr>
-              <a:t>29/07/2016</a:t>
+              <a:t>14/09/2016</a:t>
             </a:fld>
             <a:endParaRPr lang="pt-BR" dirty="0"/>
           </a:p>
@@ -1607,7 +1607,7 @@
             <a:pPr>
               <a:defRPr/>
             </a:pPr>
-            <a:fld id="{36D729E5-D308-47C6-9254-2280A0EF45E1}" type="slidenum">
+            <a:fld id="{E61B91FB-0439-4EDE-ACB5-CAE3389B973C}" type="slidenum">
               <a:rPr lang="pt-BR" altLang="pt-BR"/>
               <a:pPr>
                 <a:defRPr/>
@@ -1621,7 +1621,7 @@
     </p:spTree>
     <p:extLst>
       <p:ext uri="{BB962C8B-B14F-4D97-AF65-F5344CB8AC3E}">
-        <p14:creationId xmlns:p14="http://schemas.microsoft.com/office/powerpoint/2010/main" val="321644757"/>
+        <p14:creationId xmlns:p14="http://schemas.microsoft.com/office/powerpoint/2010/main" val="3326372971"/>
       </p:ext>
     </p:extLst>
   </p:cSld>
@@ -1732,12 +1732,12 @@
             <a:pPr>
               <a:defRPr/>
             </a:pPr>
-            <a:fld id="{A4BF320F-A07D-4F42-BE4A-FCF2795BF095}" type="datetime1">
+            <a:fld id="{278AAF53-830B-43FB-A20D-6C5C20CE6B1B}" type="datetime1">
               <a:rPr lang="pt-BR"/>
               <a:pPr>
                 <a:defRPr/>
               </a:pPr>
-              <a:t>29/07/2016</a:t>
+              <a:t>14/09/2016</a:t>
             </a:fld>
             <a:endParaRPr lang="pt-BR" dirty="0"/>
           </a:p>
@@ -1795,7 +1795,7 @@
             <a:pPr>
               <a:defRPr/>
             </a:pPr>
-            <a:fld id="{431BB040-DEAF-41CF-8E99-50F11BE2F3A2}" type="slidenum">
+            <a:fld id="{CD760916-871E-467A-9B78-7540F2A75D0E}" type="slidenum">
               <a:rPr lang="pt-BR" altLang="pt-BR"/>
               <a:pPr>
                 <a:defRPr/>
@@ -1809,7 +1809,7 @@
     </p:spTree>
     <p:extLst>
       <p:ext uri="{BB962C8B-B14F-4D97-AF65-F5344CB8AC3E}">
-        <p14:creationId xmlns:p14="http://schemas.microsoft.com/office/powerpoint/2010/main" val="1284009549"/>
+        <p14:creationId xmlns:p14="http://schemas.microsoft.com/office/powerpoint/2010/main" val="3301306026"/>
       </p:ext>
     </p:extLst>
   </p:cSld>
@@ -1893,12 +1893,12 @@
             <a:pPr>
               <a:defRPr/>
             </a:pPr>
-            <a:fld id="{7AF65D46-C760-4283-969B-24EB7FEAF807}" type="datetime1">
+            <a:fld id="{8F42AC7A-C680-4507-98B1-15965CC20C5D}" type="datetime1">
               <a:rPr lang="pt-BR"/>
               <a:pPr>
                 <a:defRPr/>
               </a:pPr>
-              <a:t>29/07/2016</a:t>
+              <a:t>14/09/2016</a:t>
             </a:fld>
             <a:endParaRPr lang="pt-BR" dirty="0"/>
           </a:p>
@@ -1987,7 +1987,7 @@
           </a:bodyPr>
           <a:lstStyle>
             <a:lvl1pPr algn="r" eaLnBrk="1" hangingPunct="1">
-              <a:defRPr sz="1200" b="1" smtClean="0">
+              <a:defRPr sz="1200" b="1">
                 <a:effectLst>
                   <a:outerShdw blurRad="38100" dist="38100" dir="2700000" algn="tl">
                     <a:srgbClr val="C0C0C0"/>
@@ -2001,7 +2001,7 @@
             <a:pPr>
               <a:defRPr/>
             </a:pPr>
-            <a:fld id="{97D91984-F081-4A2D-B0F8-6BA4F5FB0806}" type="slidenum">
+            <a:fld id="{5659E01F-E61F-4112-90FA-2EBA4A0F6B96}" type="slidenum">
               <a:rPr lang="pt-BR" altLang="pt-BR"/>
               <a:pPr>
                 <a:defRPr/>
@@ -3197,7 +3197,7 @@
               <a:pPr>
                 <a:defRPr/>
               </a:pPr>
-              <a:t>29/07/2016</a:t>
+              <a:t>14/09/2016</a:t>
             </a:fld>
             <a:endParaRPr lang="pt-BR" dirty="0"/>
           </a:p>
@@ -3318,7 +3318,7 @@
             <a:pPr>
               <a:defRPr/>
             </a:pPr>
-            <a:fld id="{1E3CBA7F-533A-4D93-86C5-DCFA45DF67F1}" type="slidenum">
+            <a:fld id="{C1CCAB8E-9CF5-4A09-AF12-4B96CBC232FF}" type="slidenum">
               <a:rPr lang="pt-BR" altLang="pt-BR" sz="1200" smtClean="0">
                 <a:latin typeface="Verdana" panose="020B0604030504040204" pitchFamily="34" charset="0"/>
               </a:rPr>
@@ -3664,7 +3664,7 @@
               <a:pPr>
                 <a:defRPr/>
               </a:pPr>
-              <a:t>29/07/2016</a:t>
+              <a:t>14/09/2016</a:t>
             </a:fld>
             <a:endParaRPr lang="pt-BR" dirty="0"/>
           </a:p>
@@ -3785,7 +3785,7 @@
             <a:pPr>
               <a:defRPr/>
             </a:pPr>
-            <a:fld id="{13AC70A3-8522-4F89-B5E2-D9A7A18AF18E}" type="slidenum">
+            <a:fld id="{601CF846-9F2B-4C5A-AF18-EDB53F7A3540}" type="slidenum">
               <a:rPr lang="pt-BR" altLang="pt-BR" sz="1200" smtClean="0">
                 <a:latin typeface="Verdana" panose="020B0604030504040204" pitchFamily="34" charset="0"/>
               </a:rPr>
@@ -4221,7 +4221,7 @@
               <a:pPr>
                 <a:defRPr/>
               </a:pPr>
-              <a:t>29/07/2016</a:t>
+              <a:t>14/09/2016</a:t>
             </a:fld>
             <a:endParaRPr lang="pt-BR" dirty="0"/>
           </a:p>
@@ -4342,7 +4342,7 @@
             <a:pPr>
               <a:defRPr/>
             </a:pPr>
-            <a:fld id="{B64917CC-5328-4D80-BE73-004B669F29E3}" type="slidenum">
+            <a:fld id="{D6E3D96E-4EBB-421A-BA35-712374D54888}" type="slidenum">
               <a:rPr lang="pt-BR" altLang="pt-BR" sz="1200" smtClean="0">
                 <a:latin typeface="Verdana" panose="020B0604030504040204" pitchFamily="34" charset="0"/>
               </a:rPr>
@@ -4997,7 +4997,7 @@
               <a:pPr>
                 <a:defRPr/>
               </a:pPr>
-              <a:t>29/07/2016</a:t>
+              <a:t>14/09/2016</a:t>
             </a:fld>
             <a:endParaRPr lang="pt-BR" dirty="0"/>
           </a:p>
@@ -5118,7 +5118,7 @@
             <a:pPr>
               <a:defRPr/>
             </a:pPr>
-            <a:fld id="{5F03D433-5F9F-48D9-A8BB-0820DDF4D43D}" type="slidenum">
+            <a:fld id="{74001B3F-7C9A-469C-A907-353277BEE2A4}" type="slidenum">
               <a:rPr lang="pt-BR" altLang="pt-BR" sz="1200" smtClean="0">
                 <a:latin typeface="Verdana" panose="020B0604030504040204" pitchFamily="34" charset="0"/>
               </a:rPr>
@@ -5992,7 +5992,7 @@
               <a:pPr>
                 <a:defRPr/>
               </a:pPr>
-              <a:t>29/07/2016</a:t>
+              <a:t>14/09/2016</a:t>
             </a:fld>
             <a:endParaRPr lang="pt-BR" dirty="0"/>
           </a:p>
@@ -6113,7 +6113,7 @@
             <a:pPr>
               <a:defRPr/>
             </a:pPr>
-            <a:fld id="{2F2372B1-C529-4B7A-8D3B-72B3C93EE768}" type="slidenum">
+            <a:fld id="{E38D8BB6-1E95-4617-9F6D-E7E1C1763601}" type="slidenum">
               <a:rPr lang="pt-BR" altLang="pt-BR" sz="1200" smtClean="0">
                 <a:latin typeface="Verdana" panose="020B0604030504040204" pitchFamily="34" charset="0"/>
               </a:rPr>
@@ -7561,7 +7561,7 @@
               <a:pPr>
                 <a:defRPr/>
               </a:pPr>
-              <a:t>29/07/2016</a:t>
+              <a:t>14/09/2016</a:t>
             </a:fld>
             <a:endParaRPr lang="pt-BR" dirty="0"/>
           </a:p>
@@ -7682,7 +7682,7 @@
             <a:pPr>
               <a:defRPr/>
             </a:pPr>
-            <a:fld id="{D3A84F37-B5E3-4A42-BEC5-BEB05A9CAD7B}" type="slidenum">
+            <a:fld id="{F0FC2D74-532A-473D-A443-DAF2C3548D08}" type="slidenum">
               <a:rPr lang="pt-BR" altLang="pt-BR" sz="1200" smtClean="0">
                 <a:latin typeface="Verdana" panose="020B0604030504040204" pitchFamily="34" charset="0"/>
               </a:rPr>
@@ -8144,7 +8144,7 @@
               <a:pPr>
                 <a:defRPr/>
               </a:pPr>
-              <a:t>29/07/2016</a:t>
+              <a:t>14/09/2016</a:t>
             </a:fld>
             <a:endParaRPr lang="pt-BR" dirty="0"/>
           </a:p>
@@ -8265,7 +8265,7 @@
             <a:pPr>
               <a:defRPr/>
             </a:pPr>
-            <a:fld id="{352C2D88-4B89-47C2-8410-7F7252D0081B}" type="slidenum">
+            <a:fld id="{B26C75FC-E330-4430-A01D-D2BCACAB651A}" type="slidenum">
               <a:rPr lang="pt-BR" altLang="pt-BR" sz="1200" smtClean="0">
                 <a:latin typeface="Verdana" panose="020B0604030504040204" pitchFamily="34" charset="0"/>
               </a:rPr>
@@ -9157,7 +9157,7 @@
               <a:pPr>
                 <a:defRPr/>
               </a:pPr>
-              <a:t>29/07/2016</a:t>
+              <a:t>14/09/2016</a:t>
             </a:fld>
             <a:endParaRPr lang="pt-BR" dirty="0"/>
           </a:p>
@@ -9278,7 +9278,7 @@
             <a:pPr>
               <a:defRPr/>
             </a:pPr>
-            <a:fld id="{D398D653-9D81-4A63-BD7E-C9F00253E014}" type="slidenum">
+            <a:fld id="{DF001CDC-23F0-4485-A0A3-9904E75098B9}" type="slidenum">
               <a:rPr lang="pt-BR" altLang="pt-BR" sz="1200" smtClean="0">
                 <a:latin typeface="Verdana" panose="020B0604030504040204" pitchFamily="34" charset="0"/>
               </a:rPr>
@@ -10060,7 +10060,7 @@
               <a:pPr>
                 <a:defRPr/>
               </a:pPr>
-              <a:t>29/07/2016</a:t>
+              <a:t>14/09/2016</a:t>
             </a:fld>
             <a:endParaRPr lang="pt-BR" dirty="0"/>
           </a:p>
@@ -10181,7 +10181,7 @@
             <a:pPr>
               <a:defRPr/>
             </a:pPr>
-            <a:fld id="{D1F8D5E8-E90D-46C8-B350-F8BA1F45BDC2}" type="slidenum">
+            <a:fld id="{4A424549-B997-4FE3-851A-31092A584ED0}" type="slidenum">
               <a:rPr lang="pt-BR" altLang="pt-BR" sz="1200" smtClean="0">
                 <a:latin typeface="Verdana" panose="020B0604030504040204" pitchFamily="34" charset="0"/>
               </a:rPr>
@@ -10630,7 +10630,7 @@
               <a:pPr>
                 <a:defRPr/>
               </a:pPr>
-              <a:t>29/07/2016</a:t>
+              <a:t>14/09/2016</a:t>
             </a:fld>
             <a:endParaRPr lang="pt-BR" dirty="0"/>
           </a:p>
@@ -10751,7 +10751,7 @@
             <a:pPr>
               <a:defRPr/>
             </a:pPr>
-            <a:fld id="{1BEBC1FF-5672-41DE-93B0-5E899851C615}" type="slidenum">
+            <a:fld id="{4FF128B1-825D-442A-B3B4-FFB1AB5071EE}" type="slidenum">
               <a:rPr lang="pt-BR" altLang="pt-BR" sz="1200" smtClean="0">
                 <a:latin typeface="Verdana" panose="020B0604030504040204" pitchFamily="34" charset="0"/>
               </a:rPr>
@@ -11754,7 +11754,7 @@
               <a:pPr>
                 <a:defRPr/>
               </a:pPr>
-              <a:t>29/07/2016</a:t>
+              <a:t>14/09/2016</a:t>
             </a:fld>
             <a:endParaRPr lang="pt-BR" dirty="0"/>
           </a:p>
@@ -11875,7 +11875,7 @@
             <a:pPr>
               <a:defRPr/>
             </a:pPr>
-            <a:fld id="{8FDBC17F-C9BB-4FE8-AB7D-D5FCA250D071}" type="slidenum">
+            <a:fld id="{CE7BFA5A-5D1A-496F-8512-6D5AC1C1E1C4}" type="slidenum">
               <a:rPr lang="pt-BR" altLang="pt-BR" sz="1200" smtClean="0">
                 <a:latin typeface="Verdana" panose="020B0604030504040204" pitchFamily="34" charset="0"/>
               </a:rPr>
@@ -12424,7 +12424,7 @@
               <a:pPr>
                 <a:defRPr/>
               </a:pPr>
-              <a:t>29/07/2016</a:t>
+              <a:t>14/09/2016</a:t>
             </a:fld>
             <a:endParaRPr lang="pt-BR" dirty="0"/>
           </a:p>
@@ -12545,7 +12545,7 @@
             <a:pPr>
               <a:defRPr/>
             </a:pPr>
-            <a:fld id="{16617638-8D95-4221-B875-573070389B61}" type="slidenum">
+            <a:fld id="{32BB41DB-68F3-43BD-BC1B-C200BE8D06E2}" type="slidenum">
               <a:rPr lang="pt-BR" altLang="pt-BR" sz="1200" smtClean="0">
                 <a:latin typeface="Verdana" panose="020B0604030504040204" pitchFamily="34" charset="0"/>
               </a:rPr>
@@ -13366,7 +13366,7 @@
               <a:pPr>
                 <a:defRPr/>
               </a:pPr>
-              <a:t>29/07/2016</a:t>
+              <a:t>14/09/2016</a:t>
             </a:fld>
             <a:endParaRPr lang="pt-BR" dirty="0"/>
           </a:p>
@@ -13487,7 +13487,7 @@
             <a:pPr>
               <a:defRPr/>
             </a:pPr>
-            <a:fld id="{54912CB9-2C55-4C75-AAAF-427F6B05A2C0}" type="slidenum">
+            <a:fld id="{D4534145-93A3-41EB-A3D2-7C531365A565}" type="slidenum">
               <a:rPr lang="pt-BR" altLang="pt-BR" sz="1200" smtClean="0">
                 <a:latin typeface="Verdana" panose="020B0604030504040204" pitchFamily="34" charset="0"/>
               </a:rPr>
@@ -13984,7 +13984,7 @@
               <a:pPr>
                 <a:defRPr/>
               </a:pPr>
-              <a:t>29/07/2016</a:t>
+              <a:t>14/09/2016</a:t>
             </a:fld>
             <a:endParaRPr lang="pt-BR" dirty="0"/>
           </a:p>
@@ -14105,7 +14105,7 @@
             <a:pPr>
               <a:defRPr/>
             </a:pPr>
-            <a:fld id="{C373D2B3-8D6B-4B52-A693-4A8267A9904C}" type="slidenum">
+            <a:fld id="{9E77A8A9-CF24-4812-88AB-EB9DCCF687A3}" type="slidenum">
               <a:rPr lang="pt-BR" altLang="pt-BR" sz="1200" smtClean="0">
                 <a:latin typeface="Verdana" panose="020B0604030504040204" pitchFamily="34" charset="0"/>
               </a:rPr>
@@ -14632,7 +14632,7 @@
               <a:pPr>
                 <a:defRPr/>
               </a:pPr>
-              <a:t>29/07/2016</a:t>
+              <a:t>14/09/2016</a:t>
             </a:fld>
             <a:endParaRPr lang="pt-BR" dirty="0"/>
           </a:p>
@@ -14753,7 +14753,7 @@
             <a:pPr>
               <a:defRPr/>
             </a:pPr>
-            <a:fld id="{440F2FD6-5294-4361-867D-649B0A51AF4F}" type="slidenum">
+            <a:fld id="{12A166C6-4D5A-4DB9-B255-332FBFC29940}" type="slidenum">
               <a:rPr lang="pt-BR" altLang="pt-BR" sz="1200" smtClean="0">
                 <a:latin typeface="Verdana" panose="020B0604030504040204" pitchFamily="34" charset="0"/>
               </a:rPr>
@@ -15908,7 +15908,7 @@
               <a:pPr>
                 <a:defRPr/>
               </a:pPr>
-              <a:t>29/07/2016</a:t>
+              <a:t>14/09/2016</a:t>
             </a:fld>
             <a:endParaRPr lang="pt-BR" dirty="0"/>
           </a:p>
@@ -16029,7 +16029,7 @@
             <a:pPr>
               <a:defRPr/>
             </a:pPr>
-            <a:fld id="{C8643FD0-90AF-4BAF-902F-BF5A7E09A6C9}" type="slidenum">
+            <a:fld id="{88FCA685-EFE6-4496-9F5A-3FB34968BCB8}" type="slidenum">
               <a:rPr lang="pt-BR" altLang="pt-BR" sz="1200" smtClean="0">
                 <a:latin typeface="Verdana" panose="020B0604030504040204" pitchFamily="34" charset="0"/>
               </a:rPr>
@@ -16478,7 +16478,7 @@
               <a:pPr>
                 <a:defRPr/>
               </a:pPr>
-              <a:t>29/07/2016</a:t>
+              <a:t>14/09/2016</a:t>
             </a:fld>
             <a:endParaRPr lang="pt-BR" dirty="0"/>
           </a:p>
@@ -16599,7 +16599,7 @@
             <a:pPr>
               <a:defRPr/>
             </a:pPr>
-            <a:fld id="{ACF47D89-9D14-4642-9E9F-CAD0E73DBC60}" type="slidenum">
+            <a:fld id="{6B50EE8F-336E-47A6-87D4-3A73FB0A45B8}" type="slidenum">
               <a:rPr lang="pt-BR" altLang="pt-BR" sz="1200" smtClean="0">
                 <a:latin typeface="Verdana" panose="020B0604030504040204" pitchFamily="34" charset="0"/>
               </a:rPr>
@@ -17459,7 +17459,7 @@
               <a:pPr>
                 <a:defRPr/>
               </a:pPr>
-              <a:t>29/07/2016</a:t>
+              <a:t>14/09/2016</a:t>
             </a:fld>
             <a:endParaRPr lang="pt-BR" dirty="0"/>
           </a:p>
@@ -17580,7 +17580,7 @@
             <a:pPr>
               <a:defRPr/>
             </a:pPr>
-            <a:fld id="{51C378DD-D94F-4A62-AF43-7F44495629AA}" type="slidenum">
+            <a:fld id="{782EF7DC-546E-47EC-B3FB-047F39110C3F}" type="slidenum">
               <a:rPr lang="pt-BR" altLang="pt-BR" sz="1200" smtClean="0">
                 <a:latin typeface="Verdana" panose="020B0604030504040204" pitchFamily="34" charset="0"/>
               </a:rPr>
@@ -18318,7 +18318,7 @@
               <a:pPr>
                 <a:defRPr/>
               </a:pPr>
-              <a:t>29/07/2016</a:t>
+              <a:t>14/09/2016</a:t>
             </a:fld>
             <a:endParaRPr lang="pt-BR" dirty="0"/>
           </a:p>
@@ -18439,7 +18439,7 @@
             <a:pPr>
               <a:defRPr/>
             </a:pPr>
-            <a:fld id="{FC36926F-25FE-407D-AA83-40AED6D1828C}" type="slidenum">
+            <a:fld id="{7CD9E231-89D2-4A2E-AD3E-EBBA68A4226C}" type="slidenum">
               <a:rPr lang="pt-BR" altLang="pt-BR" sz="1200" smtClean="0">
                 <a:latin typeface="Verdana" panose="020B0604030504040204" pitchFamily="34" charset="0"/>
               </a:rPr>
@@ -19288,7 +19288,7 @@
               <a:pPr>
                 <a:defRPr/>
               </a:pPr>
-              <a:t>29/07/2016</a:t>
+              <a:t>14/09/2016</a:t>
             </a:fld>
             <a:endParaRPr lang="pt-BR" dirty="0"/>
           </a:p>
@@ -19409,7 +19409,7 @@
             <a:pPr>
               <a:defRPr/>
             </a:pPr>
-            <a:fld id="{63B46E2E-2F68-42F0-A29C-F4E02EF06537}" type="slidenum">
+            <a:fld id="{71F4652A-7109-443C-A46C-AF52CACF4749}" type="slidenum">
               <a:rPr lang="pt-BR" altLang="pt-BR" sz="1200" smtClean="0">
                 <a:latin typeface="Verdana" panose="020B0604030504040204" pitchFamily="34" charset="0"/>
               </a:rPr>
@@ -19933,7 +19933,7 @@
               <a:pPr>
                 <a:defRPr/>
               </a:pPr>
-              <a:t>29/07/2016</a:t>
+              <a:t>14/09/2016</a:t>
             </a:fld>
             <a:endParaRPr lang="pt-BR" dirty="0"/>
           </a:p>
@@ -20054,7 +20054,7 @@
             <a:pPr>
               <a:defRPr/>
             </a:pPr>
-            <a:fld id="{E3AF5069-BE55-4C76-A76F-955AF05324CF}" type="slidenum">
+            <a:fld id="{5A0845A8-5B8C-4DD6-9F20-A4537DFDD1F2}" type="slidenum">
               <a:rPr lang="pt-BR" altLang="pt-BR" sz="1200" smtClean="0">
                 <a:latin typeface="Verdana" panose="020B0604030504040204" pitchFamily="34" charset="0"/>
               </a:rPr>
@@ -20395,7 +20395,7 @@
               <a:pPr>
                 <a:defRPr/>
               </a:pPr>
-              <a:t>29/07/2016</a:t>
+              <a:t>14/09/2016</a:t>
             </a:fld>
             <a:endParaRPr lang="pt-BR" dirty="0"/>
           </a:p>
@@ -20516,7 +20516,7 @@
             <a:pPr>
               <a:defRPr/>
             </a:pPr>
-            <a:fld id="{A487A975-A569-4433-AD4F-1313688C009B}" type="slidenum">
+            <a:fld id="{AE14B19E-03E5-4C54-9CFA-DB680137CFB2}" type="slidenum">
               <a:rPr lang="pt-BR" altLang="pt-BR" sz="1200" smtClean="0">
                 <a:latin typeface="Verdana" panose="020B0604030504040204" pitchFamily="34" charset="0"/>
               </a:rPr>
@@ -21084,7 +21084,7 @@
               <a:pPr>
                 <a:defRPr/>
               </a:pPr>
-              <a:t>29/07/2016</a:t>
+              <a:t>14/09/2016</a:t>
             </a:fld>
             <a:endParaRPr lang="pt-BR" dirty="0"/>
           </a:p>
@@ -21205,7 +21205,7 @@
             <a:pPr>
               <a:defRPr/>
             </a:pPr>
-            <a:fld id="{01E4691B-042E-4F51-AE38-1AF8EBCE9BFB}" type="slidenum">
+            <a:fld id="{ED59BD73-7C32-40C2-983A-0CA57B0046FE}" type="slidenum">
               <a:rPr lang="pt-BR" altLang="pt-BR" sz="1200" smtClean="0">
                 <a:latin typeface="Verdana" panose="020B0604030504040204" pitchFamily="34" charset="0"/>
               </a:rPr>
@@ -21823,7 +21823,7 @@
               <a:pPr>
                 <a:defRPr/>
               </a:pPr>
-              <a:t>29/07/2016</a:t>
+              <a:t>14/09/2016</a:t>
             </a:fld>
             <a:endParaRPr lang="pt-BR" dirty="0"/>
           </a:p>
@@ -21944,7 +21944,7 @@
             <a:pPr>
               <a:defRPr/>
             </a:pPr>
-            <a:fld id="{9FAA1188-0369-49A9-BE88-1F5301FDD2DA}" type="slidenum">
+            <a:fld id="{6A00A13B-4A69-4BF1-A06E-08D7F3B57949}" type="slidenum">
               <a:rPr lang="pt-BR" altLang="pt-BR" sz="1200" smtClean="0">
                 <a:latin typeface="Verdana" panose="020B0604030504040204" pitchFamily="34" charset="0"/>
               </a:rPr>
@@ -22417,7 +22417,7 @@
               <a:pPr>
                 <a:defRPr/>
               </a:pPr>
-              <a:t>29/07/2016</a:t>
+              <a:t>14/09/2016</a:t>
             </a:fld>
             <a:endParaRPr lang="pt-BR" dirty="0"/>
           </a:p>
@@ -22538,7 +22538,7 @@
             <a:pPr>
               <a:defRPr/>
             </a:pPr>
-            <a:fld id="{980830C4-68D6-42E8-8BF5-93637695BD8A}" type="slidenum">
+            <a:fld id="{37DF723B-32A5-48E1-9F6F-56A3F8F95A42}" type="slidenum">
               <a:rPr lang="pt-BR" altLang="pt-BR" sz="1200" smtClean="0">
                 <a:latin typeface="Verdana" panose="020B0604030504040204" pitchFamily="34" charset="0"/>
               </a:rPr>
@@ -23398,7 +23398,7 @@
               <a:pPr>
                 <a:defRPr/>
               </a:pPr>
-              <a:t>29/07/2016</a:t>
+              <a:t>14/09/2016</a:t>
             </a:fld>
             <a:endParaRPr lang="pt-BR" dirty="0"/>
           </a:p>
@@ -23519,7 +23519,7 @@
             <a:pPr>
               <a:defRPr/>
             </a:pPr>
-            <a:fld id="{7A688621-5ECC-4892-A78B-02DD8B64BBE9}" type="slidenum">
+            <a:fld id="{0B38EAA0-1335-4032-BC35-402017CD8CD7}" type="slidenum">
               <a:rPr lang="pt-BR" altLang="pt-BR" sz="1200" smtClean="0">
                 <a:latin typeface="Verdana" panose="020B0604030504040204" pitchFamily="34" charset="0"/>
               </a:rPr>
@@ -24453,7 +24453,7 @@
               <a:pPr>
                 <a:defRPr/>
               </a:pPr>
-              <a:t>29/07/2016</a:t>
+              <a:t>14/09/2016</a:t>
             </a:fld>
             <a:endParaRPr lang="pt-BR" dirty="0"/>
           </a:p>
@@ -24574,7 +24574,7 @@
             <a:pPr>
               <a:defRPr/>
             </a:pPr>
-            <a:fld id="{31A43E4F-F516-4442-A5C1-99854284C988}" type="slidenum">
+            <a:fld id="{C6DCE085-9F25-4761-837E-C41672EE14FD}" type="slidenum">
               <a:rPr lang="pt-BR" altLang="pt-BR" sz="1200" smtClean="0">
                 <a:latin typeface="Verdana" panose="020B0604030504040204" pitchFamily="34" charset="0"/>
               </a:rPr>
@@ -25496,7 +25496,7 @@
               <a:pPr>
                 <a:defRPr/>
               </a:pPr>
-              <a:t>29/07/2016</a:t>
+              <a:t>14/09/2016</a:t>
             </a:fld>
             <a:endParaRPr lang="pt-BR" dirty="0"/>
           </a:p>
@@ -25617,7 +25617,7 @@
             <a:pPr>
               <a:defRPr/>
             </a:pPr>
-            <a:fld id="{F772D3A8-0179-46D4-AA2D-8B2E4F1695E0}" type="slidenum">
+            <a:fld id="{681069DB-99C4-4A0D-8062-6C3C9379BE68}" type="slidenum">
               <a:rPr lang="pt-BR" altLang="pt-BR" sz="1200" smtClean="0">
                 <a:latin typeface="Verdana" panose="020B0604030504040204" pitchFamily="34" charset="0"/>
               </a:rPr>
@@ -26128,7 +26128,7 @@
               <a:pPr>
                 <a:defRPr/>
               </a:pPr>
-              <a:t>29/07/2016</a:t>
+              <a:t>14/09/2016</a:t>
             </a:fld>
             <a:endParaRPr lang="pt-BR" dirty="0"/>
           </a:p>
@@ -26249,7 +26249,7 @@
             <a:pPr>
               <a:defRPr/>
             </a:pPr>
-            <a:fld id="{44DADA01-39D5-4BDD-A338-B3C6C5717B19}" type="slidenum">
+            <a:fld id="{2CCCFE63-A525-452F-B5B8-B08C4422D5E9}" type="slidenum">
               <a:rPr lang="pt-BR" altLang="pt-BR" sz="1200" smtClean="0">
                 <a:latin typeface="Verdana" panose="020B0604030504040204" pitchFamily="34" charset="0"/>
               </a:rPr>
@@ -26804,7 +26804,7 @@
               <a:pPr>
                 <a:defRPr/>
               </a:pPr>
-              <a:t>29/07/2016</a:t>
+              <a:t>14/09/2016</a:t>
             </a:fld>
             <a:endParaRPr lang="pt-BR" dirty="0"/>
           </a:p>
@@ -26925,7 +26925,7 @@
             <a:pPr>
               <a:defRPr/>
             </a:pPr>
-            <a:fld id="{F466A292-428F-4056-A204-5904BA5024C3}" type="slidenum">
+            <a:fld id="{18F6A3A4-EFD7-45F8-AD37-E885A4F1E48F}" type="slidenum">
               <a:rPr lang="pt-BR" altLang="pt-BR" sz="1200" smtClean="0">
                 <a:latin typeface="Verdana" panose="020B0604030504040204" pitchFamily="34" charset="0"/>
               </a:rPr>
@@ -27554,7 +27554,7 @@
               <a:pPr>
                 <a:defRPr/>
               </a:pPr>
-              <a:t>29/07/2016</a:t>
+              <a:t>14/09/2016</a:t>
             </a:fld>
             <a:endParaRPr lang="pt-BR" dirty="0"/>
           </a:p>
@@ -27675,7 +27675,7 @@
             <a:pPr>
               <a:defRPr/>
             </a:pPr>
-            <a:fld id="{49DC4F85-5648-4D0E-A86D-708A69DA0D99}" type="slidenum">
+            <a:fld id="{2630FA8F-8696-451E-B203-8644E297F469}" type="slidenum">
               <a:rPr lang="pt-BR" altLang="pt-BR" sz="1200" smtClean="0">
                 <a:latin typeface="Verdana" panose="020B0604030504040204" pitchFamily="34" charset="0"/>
               </a:rPr>
@@ -28128,45 +28128,28 @@
                 <a:latin typeface="Courier New" pitchFamily="49" charset="0"/>
                 <a:cs typeface="Courier New" pitchFamily="49" charset="0"/>
               </a:rPr>
-              <a:t> = </a:t>
-            </a:r>
-            <a:r>
-              <a:rPr lang="pt-BR" sz="1400" b="1" dirty="0">
+              <a:t> = MAIUSC(</a:t>
+            </a:r>
+            <a:r>
+              <a:rPr lang="pt-BR" sz="1400" b="1" dirty="0" err="1">
                 <a:solidFill>
                   <a:srgbClr val="0000CC"/>
                 </a:solidFill>
                 <a:latin typeface="Courier New" pitchFamily="49" charset="0"/>
                 <a:cs typeface="Courier New" pitchFamily="49" charset="0"/>
               </a:rPr>
-              <a:t>MAIUSC(</a:t>
-            </a:r>
-            <a:r>
-              <a:rPr lang="pt-BR" sz="1400" b="1" dirty="0" err="1">
+              <a:t>getchar</a:t>
+            </a:r>
+            <a:r>
+              <a:rPr lang="pt-BR" sz="1400" b="1" dirty="0">
                 <a:solidFill>
                   <a:srgbClr val="0000CC"/>
                 </a:solidFill>
                 <a:latin typeface="Courier New" pitchFamily="49" charset="0"/>
                 <a:cs typeface="Courier New" pitchFamily="49" charset="0"/>
               </a:rPr>
-              <a:t>getchar</a:t>
-            </a:r>
-            <a:r>
-              <a:rPr lang="pt-BR" sz="1400" b="1" dirty="0">
-                <a:solidFill>
-                  <a:srgbClr val="0000CC"/>
-                </a:solidFill>
-                <a:latin typeface="Courier New" pitchFamily="49" charset="0"/>
-                <a:cs typeface="Courier New" pitchFamily="49" charset="0"/>
-              </a:rPr>
               <a:t>());</a:t>
             </a:r>
-            <a:endParaRPr lang="pt-BR" sz="1400" b="1" dirty="0">
-              <a:solidFill>
-                <a:srgbClr val="0000CC"/>
-              </a:solidFill>
-              <a:latin typeface="Courier New" pitchFamily="49" charset="0"/>
-              <a:cs typeface="Courier New" pitchFamily="49" charset="0"/>
-            </a:endParaRPr>
           </a:p>
           <a:p>
             <a:pPr lvl="1" algn="just" eaLnBrk="1" hangingPunct="1">
@@ -28406,7 +28389,7 @@
               <a:pPr>
                 <a:defRPr/>
               </a:pPr>
-              <a:t>29/07/2016</a:t>
+              <a:t>14/09/2016</a:t>
             </a:fld>
             <a:endParaRPr lang="pt-BR" dirty="0"/>
           </a:p>
@@ -28527,7 +28510,7 @@
             <a:pPr>
               <a:defRPr/>
             </a:pPr>
-            <a:fld id="{400C5240-F653-464A-8865-569CCF2F67F9}" type="slidenum">
+            <a:fld id="{3A5D2C87-074D-4A30-9DB0-99E7932F2554}" type="slidenum">
               <a:rPr lang="pt-BR" altLang="pt-BR" sz="1200" smtClean="0">
                 <a:latin typeface="Verdana" panose="020B0604030504040204" pitchFamily="34" charset="0"/>
               </a:rPr>
@@ -28900,7 +28883,7 @@
               <a:pPr>
                 <a:defRPr/>
               </a:pPr>
-              <a:t>29/07/2016</a:t>
+              <a:t>14/09/2016</a:t>
             </a:fld>
             <a:endParaRPr lang="pt-BR" dirty="0"/>
           </a:p>
@@ -29021,7 +29004,7 @@
             <a:pPr>
               <a:defRPr/>
             </a:pPr>
-            <a:fld id="{916FF875-4CF1-4F0D-9856-F9B9B1015062}" type="slidenum">
+            <a:fld id="{C96D4321-1A8F-4E0D-9D6F-0F60752D51C7}" type="slidenum">
               <a:rPr lang="pt-BR" altLang="pt-BR" sz="1200" smtClean="0">
                 <a:latin typeface="Verdana" panose="020B0604030504040204" pitchFamily="34" charset="0"/>
               </a:rPr>
@@ -29900,7 +29883,7 @@
               <a:pPr>
                 <a:defRPr/>
               </a:pPr>
-              <a:t>29/07/2016</a:t>
+              <a:t>14/09/2016</a:t>
             </a:fld>
             <a:endParaRPr lang="pt-BR" dirty="0"/>
           </a:p>
@@ -30021,7 +30004,7 @@
             <a:pPr>
               <a:defRPr/>
             </a:pPr>
-            <a:fld id="{F8325BDF-DCDE-42B7-AE2C-1C00F8E08D36}" type="slidenum">
+            <a:fld id="{8C330B08-D4F3-43B1-9AF5-FF4F8C5D41A7}" type="slidenum">
               <a:rPr lang="pt-BR" altLang="pt-BR" sz="1200" smtClean="0">
                 <a:latin typeface="Verdana" panose="020B0604030504040204" pitchFamily="34" charset="0"/>
               </a:rPr>
@@ -30578,7 +30561,7 @@
               <a:pPr>
                 <a:defRPr/>
               </a:pPr>
-              <a:t>29/07/2016</a:t>
+              <a:t>14/09/2016</a:t>
             </a:fld>
             <a:endParaRPr lang="pt-BR" dirty="0"/>
           </a:p>
@@ -30699,7 +30682,7 @@
             <a:pPr>
               <a:defRPr/>
             </a:pPr>
-            <a:fld id="{E33035E6-36BB-43F3-B5AF-AD386193C429}" type="slidenum">
+            <a:fld id="{58826C2F-1A74-4802-9F36-9764A3184F33}" type="slidenum">
               <a:rPr lang="pt-BR" altLang="pt-BR" sz="1200" smtClean="0">
                 <a:latin typeface="Verdana" panose="020B0604030504040204" pitchFamily="34" charset="0"/>
               </a:rPr>
@@ -31117,7 +31100,7 @@
               <a:pPr>
                 <a:defRPr/>
               </a:pPr>
-              <a:t>29/07/2016</a:t>
+              <a:t>14/09/2016</a:t>
             </a:fld>
             <a:endParaRPr lang="pt-BR" dirty="0"/>
           </a:p>
@@ -31238,7 +31221,7 @@
             <a:pPr>
               <a:defRPr/>
             </a:pPr>
-            <a:fld id="{E6B88B37-63C4-4E1B-BA3A-C7834AE95183}" type="slidenum">
+            <a:fld id="{D319CF88-4602-4C48-BC0B-32C1E183BC2B}" type="slidenum">
               <a:rPr lang="pt-BR" altLang="pt-BR" sz="1200" smtClean="0">
                 <a:latin typeface="Verdana" panose="020B0604030504040204" pitchFamily="34" charset="0"/>
               </a:rPr>
@@ -31497,7 +31480,7 @@
               <a:pPr>
                 <a:defRPr/>
               </a:pPr>
-              <a:t>29/07/2016</a:t>
+              <a:t>14/09/2016</a:t>
             </a:fld>
             <a:endParaRPr lang="pt-BR" dirty="0"/>
           </a:p>
@@ -31618,7 +31601,7 @@
             <a:pPr>
               <a:defRPr/>
             </a:pPr>
-            <a:fld id="{B2EFEEAB-C11B-4AA1-819F-5086F9936163}" type="slidenum">
+            <a:fld id="{8C3B90D4-F48E-45C7-82FD-5A5F2B9D94F7}" type="slidenum">
               <a:rPr lang="pt-BR" altLang="pt-BR" sz="1200" smtClean="0">
                 <a:latin typeface="Verdana" panose="020B0604030504040204" pitchFamily="34" charset="0"/>
               </a:rPr>
@@ -32094,7 +32077,7 @@
               <a:pPr>
                 <a:defRPr/>
               </a:pPr>
-              <a:t>29/07/2016</a:t>
+              <a:t>14/09/2016</a:t>
             </a:fld>
             <a:endParaRPr lang="pt-BR" dirty="0"/>
           </a:p>
@@ -32215,7 +32198,7 @@
             <a:pPr>
               <a:defRPr/>
             </a:pPr>
-            <a:fld id="{7A5D41E2-8AD6-4AF5-AC8A-85D1A0058104}" type="slidenum">
+            <a:fld id="{68FAC415-AFE1-4E0B-A084-D0EF3A9DC7C4}" type="slidenum">
               <a:rPr lang="pt-BR" altLang="pt-BR" sz="1200" smtClean="0">
                 <a:latin typeface="Verdana" panose="020B0604030504040204" pitchFamily="34" charset="0"/>
               </a:rPr>
@@ -32716,7 +32699,7 @@
               <a:pPr>
                 <a:defRPr/>
               </a:pPr>
-              <a:t>29/07/2016</a:t>
+              <a:t>14/09/2016</a:t>
             </a:fld>
             <a:endParaRPr lang="pt-BR" dirty="0"/>
           </a:p>
@@ -32837,7 +32820,7 @@
             <a:pPr>
               <a:defRPr/>
             </a:pPr>
-            <a:fld id="{9C2B3FAD-DC45-44B7-87FA-D15DF9E4E34A}" type="slidenum">
+            <a:fld id="{D3B57980-661D-49CE-B2A7-86694E9C0C05}" type="slidenum">
               <a:rPr lang="pt-BR" altLang="pt-BR" sz="1200" smtClean="0">
                 <a:latin typeface="Verdana" panose="020B0604030504040204" pitchFamily="34" charset="0"/>
               </a:rPr>
@@ -33670,7 +33653,7 @@
               <a:pPr>
                 <a:defRPr/>
               </a:pPr>
-              <a:t>29/07/2016</a:t>
+              <a:t>14/09/2016</a:t>
             </a:fld>
             <a:endParaRPr lang="pt-BR" dirty="0"/>
           </a:p>
@@ -33791,7 +33774,7 @@
             <a:pPr>
               <a:defRPr/>
             </a:pPr>
-            <a:fld id="{6EB71982-C763-47A7-8869-C15C3FF2AC92}" type="slidenum">
+            <a:fld id="{D4398904-C09A-4031-8CA5-F0D877A312B9}" type="slidenum">
               <a:rPr lang="pt-BR" altLang="pt-BR" sz="1200" smtClean="0">
                 <a:latin typeface="Verdana" panose="020B0604030504040204" pitchFamily="34" charset="0"/>
               </a:rPr>
@@ -34226,7 +34209,7 @@
               <a:pPr>
                 <a:defRPr/>
               </a:pPr>
-              <a:t>29/07/2016</a:t>
+              <a:t>14/09/2016</a:t>
             </a:fld>
             <a:endParaRPr lang="pt-BR" dirty="0"/>
           </a:p>
@@ -34347,7 +34330,7 @@
             <a:pPr>
               <a:defRPr/>
             </a:pPr>
-            <a:fld id="{A133D022-4C94-4B04-BF65-B98D789CFC86}" type="slidenum">
+            <a:fld id="{0F6F670B-1E50-44FB-9623-CDA4205A7C21}" type="slidenum">
               <a:rPr lang="pt-BR" altLang="pt-BR" sz="1200" smtClean="0">
                 <a:latin typeface="Verdana" panose="020B0604030504040204" pitchFamily="34" charset="0"/>
               </a:rPr>

</xml_diff>